<commit_message>
Added utility to display multiple structures at once as well as the true versions downloaded from the internet.
</commit_message>
<xml_diff>
--- a/Lennard-Jones Structures.pptx
+++ b/Lennard-Jones Structures.pptx
@@ -4872,7 +4872,7 @@
                 <a:latin typeface="Cambria Math" panose="02040503050406030204" pitchFamily="18" charset="0"/>
                 <a:ea typeface="Cambria Math" panose="02040503050406030204" pitchFamily="18" charset="0"/>
               </a:rPr>
-              <a:t>Fundamentals of Differential Equations. </a:t>
+              <a:t>Numerical Analysis. </a:t>
             </a:r>
             <a:br>
               <a:rPr lang="en-US" sz="4000" dirty="0">
@@ -4891,27 +4891,7 @@
                 <a:latin typeface="Cambria Math" panose="02040503050406030204" pitchFamily="18" charset="0"/>
                 <a:ea typeface="Cambria Math" panose="02040503050406030204" pitchFamily="18" charset="0"/>
               </a:rPr>
-              <a:t>Eighth Edition. Nagle, </a:t>
-            </a:r>
-            <a:r>
-              <a:rPr lang="en-US" sz="4000" dirty="0" err="1">
-                <a:solidFill>
-                  <a:schemeClr val="bg1"/>
-                </a:solidFill>
-                <a:latin typeface="Cambria Math" panose="02040503050406030204" pitchFamily="18" charset="0"/>
-                <a:ea typeface="Cambria Math" panose="02040503050406030204" pitchFamily="18" charset="0"/>
-              </a:rPr>
-              <a:t>Saff</a:t>
-            </a:r>
-            <a:r>
-              <a:rPr lang="en-US" sz="4000" dirty="0">
-                <a:solidFill>
-                  <a:schemeClr val="bg1"/>
-                </a:solidFill>
-                <a:latin typeface="Cambria Math" panose="02040503050406030204" pitchFamily="18" charset="0"/>
-                <a:ea typeface="Cambria Math" panose="02040503050406030204" pitchFamily="18" charset="0"/>
-              </a:rPr>
-              <a:t>, and Snider. Pg. 151-152</a:t>
+              <a:t>Second Edition. Timothy Sauer. Pg. 580-582</a:t>
             </a:r>
           </a:p>
         </p:txBody>
@@ -6196,13 +6176,6 @@
               </a:rPr>
               <a:t>What do the other structures look like?</a:t>
             </a:r>
-            <a:endParaRPr lang="en-US" sz="1800" dirty="0">
-              <a:solidFill>
-                <a:schemeClr val="bg1"/>
-              </a:solidFill>
-              <a:latin typeface="Cambria Math" panose="02040503050406030204" pitchFamily="18" charset="0"/>
-              <a:ea typeface="Cambria Math" panose="02040503050406030204" pitchFamily="18" charset="0"/>
-            </a:endParaRPr>
           </a:p>
         </p:txBody>
       </p:sp>
@@ -6615,8 +6588,8 @@
           <a:chExt cx="0" cy="0"/>
         </a:xfrm>
       </p:grpSpPr>
-      <mc:AlternateContent xmlns:mc="http://schemas.openxmlformats.org/markup-compatibility/2006">
-        <mc:Choice xmlns:a14="http://schemas.microsoft.com/office/drawing/2010/main" Requires="a14">
+      <mc:AlternateContent xmlns:mc="http://schemas.openxmlformats.org/markup-compatibility/2006" xmlns:a14="http://schemas.microsoft.com/office/drawing/2010/main">
+        <mc:Choice Requires="a14">
           <p:sp>
             <p:nvSpPr>
               <p:cNvPr id="2" name="Title 1">
@@ -7410,7 +7383,7 @@
             </p:txBody>
           </p:sp>
         </mc:Choice>
-        <mc:Fallback>
+        <mc:Fallback xmlns="">
           <p:sp>
             <p:nvSpPr>
               <p:cNvPr id="2" name="Title 1">
@@ -7671,8 +7644,8 @@
           <a:chExt cx="0" cy="0"/>
         </a:xfrm>
       </p:grpSpPr>
-      <mc:AlternateContent xmlns:mc="http://schemas.openxmlformats.org/markup-compatibility/2006">
-        <mc:Choice xmlns:a14="http://schemas.microsoft.com/office/drawing/2010/main" Requires="a14">
+      <mc:AlternateContent xmlns:mc="http://schemas.openxmlformats.org/markup-compatibility/2006" xmlns:a14="http://schemas.microsoft.com/office/drawing/2010/main">
+        <mc:Choice Requires="a14">
           <p:sp>
             <p:nvSpPr>
               <p:cNvPr id="2" name="Title 1">
@@ -8449,7 +8422,7 @@
             </p:txBody>
           </p:sp>
         </mc:Choice>
-        <mc:Fallback>
+        <mc:Fallback xmlns="">
           <p:sp>
             <p:nvSpPr>
               <p:cNvPr id="2" name="Title 1">
@@ -8576,8 +8549,8 @@
           </a:p>
         </p:txBody>
       </p:sp>
-      <mc:AlternateContent xmlns:mc="http://schemas.openxmlformats.org/markup-compatibility/2006">
-        <mc:Choice xmlns:a14="http://schemas.microsoft.com/office/drawing/2010/main" Requires="a14">
+      <mc:AlternateContent xmlns:mc="http://schemas.openxmlformats.org/markup-compatibility/2006" xmlns:a14="http://schemas.microsoft.com/office/drawing/2010/main">
+        <mc:Choice Requires="a14">
           <p:sp>
             <p:nvSpPr>
               <p:cNvPr id="4" name="TextBox 3">
@@ -8606,6 +8579,7 @@
               </a:bodyPr>
               <a:lstStyle/>
               <a:p>
+                <a:pPr/>
                 <a14:m>
                   <m:oMathPara xmlns:m="http://schemas.openxmlformats.org/officeDocument/2006/math">
                     <m:oMathParaPr>
@@ -9074,7 +9048,7 @@
             </p:txBody>
           </p:sp>
         </mc:Choice>
-        <mc:Fallback>
+        <mc:Fallback xmlns="">
           <p:sp>
             <p:nvSpPr>
               <p:cNvPr id="4" name="TextBox 3">

</xml_diff>